<commit_message>
Changed many thing, Add date in Scheme, Post can show by date, add footer, Edit main.
</commit_message>
<xml_diff>
--- a/docs/Proposals/2016104176 허재욱 컴넷 과제 그림 자료.pptx
+++ b/docs/Proposals/2016104176 허재욱 컴넷 과제 그림 자료.pptx
@@ -253,7 +253,7 @@
           <a:p>
             <a:fld id="{192DC85D-13CB-45BE-A7ED-9AB5DB8AF914}" type="datetimeFigureOut">
               <a:rPr lang="ko-KR" altLang="en-US" smtClean="0"/>
-              <a:t>2017-10-16</a:t>
+              <a:t>2017-12-09</a:t>
             </a:fld>
             <a:endParaRPr lang="ko-KR" altLang="en-US"/>
           </a:p>
@@ -423,7 +423,7 @@
           <a:p>
             <a:fld id="{192DC85D-13CB-45BE-A7ED-9AB5DB8AF914}" type="datetimeFigureOut">
               <a:rPr lang="ko-KR" altLang="en-US" smtClean="0"/>
-              <a:t>2017-10-16</a:t>
+              <a:t>2017-12-09</a:t>
             </a:fld>
             <a:endParaRPr lang="ko-KR" altLang="en-US"/>
           </a:p>
@@ -603,7 +603,7 @@
           <a:p>
             <a:fld id="{192DC85D-13CB-45BE-A7ED-9AB5DB8AF914}" type="datetimeFigureOut">
               <a:rPr lang="ko-KR" altLang="en-US" smtClean="0"/>
-              <a:t>2017-10-16</a:t>
+              <a:t>2017-12-09</a:t>
             </a:fld>
             <a:endParaRPr lang="ko-KR" altLang="en-US"/>
           </a:p>
@@ -773,7 +773,7 @@
           <a:p>
             <a:fld id="{192DC85D-13CB-45BE-A7ED-9AB5DB8AF914}" type="datetimeFigureOut">
               <a:rPr lang="ko-KR" altLang="en-US" smtClean="0"/>
-              <a:t>2017-10-16</a:t>
+              <a:t>2017-12-09</a:t>
             </a:fld>
             <a:endParaRPr lang="ko-KR" altLang="en-US"/>
           </a:p>
@@ -1019,7 +1019,7 @@
           <a:p>
             <a:fld id="{192DC85D-13CB-45BE-A7ED-9AB5DB8AF914}" type="datetimeFigureOut">
               <a:rPr lang="ko-KR" altLang="en-US" smtClean="0"/>
-              <a:t>2017-10-16</a:t>
+              <a:t>2017-12-09</a:t>
             </a:fld>
             <a:endParaRPr lang="ko-KR" altLang="en-US"/>
           </a:p>
@@ -1251,7 +1251,7 @@
           <a:p>
             <a:fld id="{192DC85D-13CB-45BE-A7ED-9AB5DB8AF914}" type="datetimeFigureOut">
               <a:rPr lang="ko-KR" altLang="en-US" smtClean="0"/>
-              <a:t>2017-10-16</a:t>
+              <a:t>2017-12-09</a:t>
             </a:fld>
             <a:endParaRPr lang="ko-KR" altLang="en-US"/>
           </a:p>
@@ -1618,7 +1618,7 @@
           <a:p>
             <a:fld id="{192DC85D-13CB-45BE-A7ED-9AB5DB8AF914}" type="datetimeFigureOut">
               <a:rPr lang="ko-KR" altLang="en-US" smtClean="0"/>
-              <a:t>2017-10-16</a:t>
+              <a:t>2017-12-09</a:t>
             </a:fld>
             <a:endParaRPr lang="ko-KR" altLang="en-US"/>
           </a:p>
@@ -1736,7 +1736,7 @@
           <a:p>
             <a:fld id="{192DC85D-13CB-45BE-A7ED-9AB5DB8AF914}" type="datetimeFigureOut">
               <a:rPr lang="ko-KR" altLang="en-US" smtClean="0"/>
-              <a:t>2017-10-16</a:t>
+              <a:t>2017-12-09</a:t>
             </a:fld>
             <a:endParaRPr lang="ko-KR" altLang="en-US"/>
           </a:p>
@@ -1831,7 +1831,7 @@
           <a:p>
             <a:fld id="{192DC85D-13CB-45BE-A7ED-9AB5DB8AF914}" type="datetimeFigureOut">
               <a:rPr lang="ko-KR" altLang="en-US" smtClean="0"/>
-              <a:t>2017-10-16</a:t>
+              <a:t>2017-12-09</a:t>
             </a:fld>
             <a:endParaRPr lang="ko-KR" altLang="en-US"/>
           </a:p>
@@ -2108,7 +2108,7 @@
           <a:p>
             <a:fld id="{192DC85D-13CB-45BE-A7ED-9AB5DB8AF914}" type="datetimeFigureOut">
               <a:rPr lang="ko-KR" altLang="en-US" smtClean="0"/>
-              <a:t>2017-10-16</a:t>
+              <a:t>2017-12-09</a:t>
             </a:fld>
             <a:endParaRPr lang="ko-KR" altLang="en-US"/>
           </a:p>
@@ -2361,7 +2361,7 @@
           <a:p>
             <a:fld id="{192DC85D-13CB-45BE-A7ED-9AB5DB8AF914}" type="datetimeFigureOut">
               <a:rPr lang="ko-KR" altLang="en-US" smtClean="0"/>
-              <a:t>2017-10-16</a:t>
+              <a:t>2017-12-09</a:t>
             </a:fld>
             <a:endParaRPr lang="ko-KR" altLang="en-US"/>
           </a:p>
@@ -2574,7 +2574,7 @@
           <a:p>
             <a:fld id="{192DC85D-13CB-45BE-A7ED-9AB5DB8AF914}" type="datetimeFigureOut">
               <a:rPr lang="ko-KR" altLang="en-US" smtClean="0"/>
-              <a:t>2017-10-16</a:t>
+              <a:t>2017-12-09</a:t>
             </a:fld>
             <a:endParaRPr lang="ko-KR" altLang="en-US"/>
           </a:p>
@@ -9214,167 +9214,98 @@
           </p:txBody>
         </p:sp>
       </p:grpSp>
-      <p:pic>
-        <p:nvPicPr>
-          <p:cNvPr id="8" name="그림 7"/>
-          <p:cNvPicPr>
-            <a:picLocks noChangeAspect="1"/>
-          </p:cNvPicPr>
+      <p:grpSp>
+        <p:nvGrpSpPr>
+          <p:cNvPr id="10" name="그룹 9"/>
+          <p:cNvGrpSpPr/>
           <p:nvPr/>
-        </p:nvPicPr>
-        <p:blipFill rotWithShape="1">
-          <a:blip r:embed="rId2">
-            <a:extLst>
-              <a:ext uri="{28A0092B-C50C-407E-A947-70E740481C1C}">
-                <a14:useLocalDpi xmlns:a14="http://schemas.microsoft.com/office/drawing/2010/main" val="0"/>
-              </a:ext>
-            </a:extLst>
-          </a:blip>
-          <a:srcRect l="1122" t="28525" r="1293" b="472"/>
-          <a:stretch/>
-        </p:blipFill>
-        <p:spPr>
+        </p:nvGrpSpPr>
+        <p:grpSpPr>
           <a:xfrm>
             <a:off x="1803400" y="2351087"/>
             <a:ext cx="8978900" cy="3821113"/>
+            <a:chOff x="1803400" y="2351087"/>
+            <a:chExt cx="8978900" cy="3821113"/>
           </a:xfrm>
-          <a:prstGeom prst="rect">
-            <a:avLst/>
-          </a:prstGeom>
-        </p:spPr>
-      </p:pic>
-      <p:sp>
-        <p:nvSpPr>
-          <p:cNvPr id="11" name="직사각형 10"/>
-          <p:cNvSpPr/>
-          <p:nvPr/>
-        </p:nvSpPr>
-        <p:spPr>
-          <a:xfrm>
-            <a:off x="1803400" y="5054600"/>
-            <a:ext cx="8978900" cy="1117600"/>
-          </a:xfrm>
-          <a:prstGeom prst="rect">
-            <a:avLst/>
-          </a:prstGeom>
-          <a:solidFill>
-            <a:schemeClr val="tx1">
-              <a:alpha val="30000"/>
-            </a:schemeClr>
-          </a:solidFill>
-          <a:ln>
-            <a:noFill/>
-          </a:ln>
-        </p:spPr>
-        <p:style>
-          <a:lnRef idx="2">
-            <a:schemeClr val="accent1">
-              <a:shade val="50000"/>
-            </a:schemeClr>
-          </a:lnRef>
-          <a:fillRef idx="1">
-            <a:schemeClr val="accent1"/>
-          </a:fillRef>
-          <a:effectRef idx="0">
-            <a:schemeClr val="accent1"/>
-          </a:effectRef>
-          <a:fontRef idx="minor">
-            <a:schemeClr val="lt1"/>
-          </a:fontRef>
-        </p:style>
-        <p:txBody>
-          <a:bodyPr rtlCol="0" anchor="ctr"/>
-          <a:lstStyle/>
-          <a:p>
-            <a:pPr algn="ctr"/>
-            <a:endParaRPr lang="ko-KR" altLang="en-US"/>
-          </a:p>
-        </p:txBody>
-      </p:sp>
-      <p:sp>
-        <p:nvSpPr>
-          <p:cNvPr id="24" name="TextBox 23"/>
-          <p:cNvSpPr txBox="1"/>
-          <p:nvPr/>
-        </p:nvSpPr>
-        <p:spPr>
-          <a:xfrm>
-            <a:off x="1985703" y="5134530"/>
-            <a:ext cx="5362993" cy="369332"/>
-          </a:xfrm>
-          <a:prstGeom prst="rect">
-            <a:avLst/>
-          </a:prstGeom>
-          <a:noFill/>
-        </p:spPr>
-        <p:txBody>
-          <a:bodyPr wrap="square" rtlCol="0">
-            <a:spAutoFit/>
-          </a:bodyPr>
-          <a:lstStyle/>
-          <a:p>
-            <a:r>
-              <a:rPr lang="en-US" altLang="ko-KR" dirty="0" smtClean="0">
-                <a:solidFill>
-                  <a:schemeClr val="bg1"/>
-                </a:solidFill>
-                <a:latin typeface="나눔바른고딕" panose="020B0603020101020101" pitchFamily="50" charset="-127"/>
-                <a:ea typeface="나눔바른고딕" panose="020B0603020101020101" pitchFamily="50" charset="-127"/>
-              </a:rPr>
-              <a:t>Project Z World</a:t>
-            </a:r>
-            <a:endParaRPr lang="ko-KR" altLang="en-US" dirty="0">
-              <a:solidFill>
-                <a:schemeClr val="bg1"/>
-              </a:solidFill>
-              <a:latin typeface="나눔바른고딕" panose="020B0603020101020101" pitchFamily="50" charset="-127"/>
-              <a:ea typeface="나눔바른고딕" panose="020B0603020101020101" pitchFamily="50" charset="-127"/>
-            </a:endParaRPr>
-          </a:p>
-        </p:txBody>
-      </p:sp>
-      <p:sp>
-        <p:nvSpPr>
-          <p:cNvPr id="43" name="TextBox 42"/>
-          <p:cNvSpPr txBox="1"/>
-          <p:nvPr/>
-        </p:nvSpPr>
-        <p:spPr>
-          <a:xfrm>
-            <a:off x="1985703" y="5506432"/>
-            <a:ext cx="7604129" cy="523220"/>
-          </a:xfrm>
-          <a:prstGeom prst="rect">
-            <a:avLst/>
-          </a:prstGeom>
-          <a:noFill/>
-        </p:spPr>
-        <p:txBody>
-          <a:bodyPr wrap="square" rtlCol="0">
-            <a:spAutoFit/>
-          </a:bodyPr>
-          <a:lstStyle/>
-          <a:p>
-            <a:r>
-              <a:rPr lang="en-US" altLang="ko-KR" sz="1400" dirty="0" smtClean="0">
-                <a:solidFill>
-                  <a:schemeClr val="bg1"/>
-                </a:solidFill>
-                <a:latin typeface="나눔바른고딕 Light" panose="020B0603020101020101" pitchFamily="50" charset="-127"/>
-                <a:ea typeface="나눔바른고딕 Light" panose="020B0603020101020101" pitchFamily="50" charset="-127"/>
-              </a:rPr>
-              <a:t>Project z world is open world zombie survivor game that developed for the demo of ‘Open world survivor tool kit’</a:t>
-            </a:r>
-            <a:endParaRPr lang="ko-KR" altLang="en-US" sz="1400" dirty="0">
-              <a:solidFill>
-                <a:schemeClr val="bg1"/>
-              </a:solidFill>
-              <a:latin typeface="나눔바른고딕 Light" panose="020B0603020101020101" pitchFamily="50" charset="-127"/>
-              <a:ea typeface="나눔바른고딕 Light" panose="020B0603020101020101" pitchFamily="50" charset="-127"/>
-            </a:endParaRPr>
-          </a:p>
-        </p:txBody>
-      </p:sp>
+        </p:grpSpPr>
+        <p:pic>
+          <p:nvPicPr>
+            <p:cNvPr id="8" name="그림 7"/>
+            <p:cNvPicPr>
+              <a:picLocks noChangeAspect="1"/>
+            </p:cNvPicPr>
+            <p:nvPr/>
+          </p:nvPicPr>
+          <p:blipFill rotWithShape="1">
+            <a:blip r:embed="rId2">
+              <a:extLst>
+                <a:ext uri="{28A0092B-C50C-407E-A947-70E740481C1C}">
+                  <a14:useLocalDpi xmlns:a14="http://schemas.microsoft.com/office/drawing/2010/main" val="0"/>
+                </a:ext>
+              </a:extLst>
+            </a:blip>
+            <a:srcRect l="1122" t="28525" r="1293" b="472"/>
+            <a:stretch/>
+          </p:blipFill>
+          <p:spPr>
+            <a:xfrm>
+              <a:off x="1803400" y="2351087"/>
+              <a:ext cx="8978900" cy="3821113"/>
+            </a:xfrm>
+            <a:prstGeom prst="rect">
+              <a:avLst/>
+            </a:prstGeom>
+          </p:spPr>
+        </p:pic>
+        <p:sp>
+          <p:nvSpPr>
+            <p:cNvPr id="11" name="직사각형 10"/>
+            <p:cNvSpPr/>
+            <p:nvPr/>
+          </p:nvSpPr>
+          <p:spPr>
+            <a:xfrm>
+              <a:off x="1803400" y="5054600"/>
+              <a:ext cx="8978900" cy="1117600"/>
+            </a:xfrm>
+            <a:prstGeom prst="rect">
+              <a:avLst/>
+            </a:prstGeom>
+            <a:solidFill>
+              <a:schemeClr val="tx1">
+                <a:alpha val="30000"/>
+              </a:schemeClr>
+            </a:solidFill>
+            <a:ln>
+              <a:noFill/>
+            </a:ln>
+          </p:spPr>
+          <p:style>
+            <a:lnRef idx="2">
+              <a:schemeClr val="accent1">
+                <a:shade val="50000"/>
+              </a:schemeClr>
+            </a:lnRef>
+            <a:fillRef idx="1">
+              <a:schemeClr val="accent1"/>
+            </a:fillRef>
+            <a:effectRef idx="0">
+              <a:schemeClr val="accent1"/>
+            </a:effectRef>
+            <a:fontRef idx="minor">
+              <a:schemeClr val="lt1"/>
+            </a:fontRef>
+          </p:style>
+          <p:txBody>
+            <a:bodyPr rtlCol="0" anchor="ctr"/>
+            <a:lstStyle/>
+            <a:p>
+              <a:pPr algn="ctr"/>
+              <a:endParaRPr lang="ko-KR" altLang="en-US"/>
+            </a:p>
+          </p:txBody>
+        </p:sp>
+      </p:grpSp>
       <p:sp>
         <p:nvSpPr>
           <p:cNvPr id="25" name="사다리꼴 24"/>
@@ -10209,6 +10140,90 @@
           </p:txBody>
         </p:sp>
       </p:grpSp>
+      <p:sp>
+        <p:nvSpPr>
+          <p:cNvPr id="61" name="TextBox 60"/>
+          <p:cNvSpPr txBox="1"/>
+          <p:nvPr/>
+        </p:nvSpPr>
+        <p:spPr>
+          <a:xfrm>
+            <a:off x="1985703" y="5134530"/>
+            <a:ext cx="5362993" cy="369332"/>
+          </a:xfrm>
+          <a:prstGeom prst="rect">
+            <a:avLst/>
+          </a:prstGeom>
+          <a:noFill/>
+        </p:spPr>
+        <p:txBody>
+          <a:bodyPr wrap="square" rtlCol="0">
+            <a:spAutoFit/>
+          </a:bodyPr>
+          <a:lstStyle/>
+          <a:p>
+            <a:r>
+              <a:rPr lang="en-US" altLang="ko-KR" dirty="0" smtClean="0">
+                <a:solidFill>
+                  <a:schemeClr val="bg1"/>
+                </a:solidFill>
+                <a:latin typeface="나눔바른고딕" panose="020B0603020101020101" pitchFamily="50" charset="-127"/>
+                <a:ea typeface="나눔바른고딕" panose="020B0603020101020101" pitchFamily="50" charset="-127"/>
+              </a:rPr>
+              <a:t>Project Z World</a:t>
+            </a:r>
+            <a:endParaRPr lang="ko-KR" altLang="en-US" dirty="0">
+              <a:solidFill>
+                <a:schemeClr val="bg1"/>
+              </a:solidFill>
+              <a:latin typeface="나눔바른고딕" panose="020B0603020101020101" pitchFamily="50" charset="-127"/>
+              <a:ea typeface="나눔바른고딕" panose="020B0603020101020101" pitchFamily="50" charset="-127"/>
+            </a:endParaRPr>
+          </a:p>
+        </p:txBody>
+      </p:sp>
+      <p:sp>
+        <p:nvSpPr>
+          <p:cNvPr id="62" name="TextBox 61"/>
+          <p:cNvSpPr txBox="1"/>
+          <p:nvPr/>
+        </p:nvSpPr>
+        <p:spPr>
+          <a:xfrm>
+            <a:off x="1985703" y="5506432"/>
+            <a:ext cx="7604129" cy="523220"/>
+          </a:xfrm>
+          <a:prstGeom prst="rect">
+            <a:avLst/>
+          </a:prstGeom>
+          <a:noFill/>
+        </p:spPr>
+        <p:txBody>
+          <a:bodyPr wrap="square" rtlCol="0">
+            <a:spAutoFit/>
+          </a:bodyPr>
+          <a:lstStyle/>
+          <a:p>
+            <a:r>
+              <a:rPr lang="en-US" altLang="ko-KR" sz="1400" dirty="0" smtClean="0">
+                <a:solidFill>
+                  <a:schemeClr val="bg1"/>
+                </a:solidFill>
+                <a:latin typeface="나눔바른고딕 Light" panose="020B0603020101020101" pitchFamily="50" charset="-127"/>
+                <a:ea typeface="나눔바른고딕 Light" panose="020B0603020101020101" pitchFamily="50" charset="-127"/>
+              </a:rPr>
+              <a:t>Project z world is a open world zombie survivor game template that can help you start your own survival like game quickly and easily.</a:t>
+            </a:r>
+            <a:endParaRPr lang="ko-KR" altLang="en-US" sz="1400" dirty="0">
+              <a:solidFill>
+                <a:schemeClr val="bg1"/>
+              </a:solidFill>
+              <a:latin typeface="나눔바른고딕 Light" panose="020B0603020101020101" pitchFamily="50" charset="-127"/>
+              <a:ea typeface="나눔바른고딕 Light" panose="020B0603020101020101" pitchFamily="50" charset="-127"/>
+            </a:endParaRPr>
+          </a:p>
+        </p:txBody>
+      </p:sp>
     </p:spTree>
     <p:extLst>
       <p:ext uri="{BB962C8B-B14F-4D97-AF65-F5344CB8AC3E}">

</xml_diff>